<commit_message>
done pca, eigenfaces, waiting for testing
</commit_message>
<xml_diff>
--- a/references/sv-slides.pptx
+++ b/references/sv-slides.pptx
@@ -6,8 +6,10 @@
   </p:sldMasterIdLst>
   <p:sldIdLst>
     <p:sldId id="256" r:id="rId2"/>
-    <p:sldId id="257" r:id="rId3"/>
-    <p:sldId id="258" r:id="rId4"/>
+    <p:sldId id="259" r:id="rId3"/>
+    <p:sldId id="257" r:id="rId4"/>
+    <p:sldId id="260" r:id="rId5"/>
+    <p:sldId id="261" r:id="rId6"/>
   </p:sldIdLst>
   <p:sldSz cx="12192000" cy="6858000"/>
   <p:notesSz cx="6858000" cy="9144000"/>
@@ -106,6 +108,11 @@
       </a:defRPr>
     </a:lvl9pPr>
   </p:defaultTextStyle>
+  <p:extLst>
+    <p:ext uri="{EFAFB233-063F-42B5-8137-9DF3F51BA10A}">
+      <p15:sldGuideLst xmlns:p15="http://schemas.microsoft.com/office/powerpoint/2012/main"/>
+    </p:ext>
+  </p:extLst>
 </p:presentation>
 </file>
 
@@ -240,7 +247,7 @@
           <a:p>
             <a:fld id="{88643ACD-26AA-A141-80B3-19984C39AC35}" type="datetimeFigureOut">
               <a:rPr lang="en-US" smtClean="0"/>
-              <a:t>7/22/15</a:t>
+              <a:t>7/24/15</a:t>
             </a:fld>
             <a:endParaRPr lang="en-US"/>
           </a:p>
@@ -410,7 +417,7 @@
           <a:p>
             <a:fld id="{88643ACD-26AA-A141-80B3-19984C39AC35}" type="datetimeFigureOut">
               <a:rPr lang="en-US" smtClean="0"/>
-              <a:t>7/22/15</a:t>
+              <a:t>7/24/15</a:t>
             </a:fld>
             <a:endParaRPr lang="en-US"/>
           </a:p>
@@ -590,7 +597,7 @@
           <a:p>
             <a:fld id="{88643ACD-26AA-A141-80B3-19984C39AC35}" type="datetimeFigureOut">
               <a:rPr lang="en-US" smtClean="0"/>
-              <a:t>7/22/15</a:t>
+              <a:t>7/24/15</a:t>
             </a:fld>
             <a:endParaRPr lang="en-US"/>
           </a:p>
@@ -760,7 +767,7 @@
           <a:p>
             <a:fld id="{88643ACD-26AA-A141-80B3-19984C39AC35}" type="datetimeFigureOut">
               <a:rPr lang="en-US" smtClean="0"/>
-              <a:t>7/22/15</a:t>
+              <a:t>7/24/15</a:t>
             </a:fld>
             <a:endParaRPr lang="en-US"/>
           </a:p>
@@ -1006,7 +1013,7 @@
           <a:p>
             <a:fld id="{88643ACD-26AA-A141-80B3-19984C39AC35}" type="datetimeFigureOut">
               <a:rPr lang="en-US" smtClean="0"/>
-              <a:t>7/22/15</a:t>
+              <a:t>7/24/15</a:t>
             </a:fld>
             <a:endParaRPr lang="en-US"/>
           </a:p>
@@ -1238,7 +1245,7 @@
           <a:p>
             <a:fld id="{88643ACD-26AA-A141-80B3-19984C39AC35}" type="datetimeFigureOut">
               <a:rPr lang="en-US" smtClean="0"/>
-              <a:t>7/22/15</a:t>
+              <a:t>7/24/15</a:t>
             </a:fld>
             <a:endParaRPr lang="en-US"/>
           </a:p>
@@ -1605,7 +1612,7 @@
           <a:p>
             <a:fld id="{88643ACD-26AA-A141-80B3-19984C39AC35}" type="datetimeFigureOut">
               <a:rPr lang="en-US" smtClean="0"/>
-              <a:t>7/22/15</a:t>
+              <a:t>7/24/15</a:t>
             </a:fld>
             <a:endParaRPr lang="en-US"/>
           </a:p>
@@ -1723,7 +1730,7 @@
           <a:p>
             <a:fld id="{88643ACD-26AA-A141-80B3-19984C39AC35}" type="datetimeFigureOut">
               <a:rPr lang="en-US" smtClean="0"/>
-              <a:t>7/22/15</a:t>
+              <a:t>7/24/15</a:t>
             </a:fld>
             <a:endParaRPr lang="en-US"/>
           </a:p>
@@ -1818,7 +1825,7 @@
           <a:p>
             <a:fld id="{88643ACD-26AA-A141-80B3-19984C39AC35}" type="datetimeFigureOut">
               <a:rPr lang="en-US" smtClean="0"/>
-              <a:t>7/22/15</a:t>
+              <a:t>7/24/15</a:t>
             </a:fld>
             <a:endParaRPr lang="en-US"/>
           </a:p>
@@ -2095,7 +2102,7 @@
           <a:p>
             <a:fld id="{88643ACD-26AA-A141-80B3-19984C39AC35}" type="datetimeFigureOut">
               <a:rPr lang="en-US" smtClean="0"/>
-              <a:t>7/22/15</a:t>
+              <a:t>7/24/15</a:t>
             </a:fld>
             <a:endParaRPr lang="en-US"/>
           </a:p>
@@ -2348,7 +2355,7 @@
           <a:p>
             <a:fld id="{88643ACD-26AA-A141-80B3-19984C39AC35}" type="datetimeFigureOut">
               <a:rPr lang="en-US" smtClean="0"/>
-              <a:t>7/22/15</a:t>
+              <a:t>7/24/15</a:t>
             </a:fld>
             <a:endParaRPr lang="en-US"/>
           </a:p>
@@ -2561,7 +2568,7 @@
           <a:p>
             <a:fld id="{88643ACD-26AA-A141-80B3-19984C39AC35}" type="datetimeFigureOut">
               <a:rPr lang="en-US" smtClean="0"/>
-              <a:t>7/22/15</a:t>
+              <a:t>7/24/15</a:t>
             </a:fld>
             <a:endParaRPr lang="en-US"/>
           </a:p>
@@ -2978,12 +2985,18 @@
         </p:nvSpPr>
         <p:spPr/>
         <p:txBody>
-          <a:bodyPr/>
+          <a:bodyPr>
+            <a:normAutofit/>
+          </a:bodyPr>
           <a:lstStyle/>
           <a:p>
             <a:r>
               <a:rPr lang="en-US" dirty="0" smtClean="0"/>
-              <a:t>Topic 1: Face Recognition</a:t>
+              <a:t>Topic 1: </a:t>
+            </a:r>
+            <a:r>
+              <a:rPr lang="en-US" dirty="0" smtClean="0"/>
+              <a:t>Personal Photo Album Mining</a:t>
             </a:r>
             <a:endParaRPr lang="en-US" dirty="0"/>
           </a:p>
@@ -3052,98 +3065,34 @@
           <a:chExt cx="0" cy="0"/>
         </a:xfrm>
       </p:grpSpPr>
-      <p:sp>
-        <p:nvSpPr>
-          <p:cNvPr id="2" name="Title 1"/>
-          <p:cNvSpPr>
-            <a:spLocks noGrp="1"/>
-          </p:cNvSpPr>
-          <p:nvPr>
-            <p:ph type="title"/>
-          </p:nvPr>
-        </p:nvSpPr>
-        <p:spPr/>
-        <p:txBody>
-          <a:bodyPr/>
-          <a:lstStyle/>
-          <a:p>
-            <a:r>
-              <a:rPr lang="en-US" dirty="0" smtClean="0"/>
-              <a:t>The Project Objectives</a:t>
-            </a:r>
-            <a:endParaRPr lang="en-US" dirty="0"/>
-          </a:p>
-        </p:txBody>
-      </p:sp>
-      <p:sp>
-        <p:nvSpPr>
-          <p:cNvPr id="3" name="Content Placeholder 2"/>
-          <p:cNvSpPr>
-            <a:spLocks noGrp="1"/>
-          </p:cNvSpPr>
-          <p:nvPr>
-            <p:ph idx="1"/>
-          </p:nvPr>
-        </p:nvSpPr>
-        <p:spPr/>
-        <p:txBody>
-          <a:bodyPr/>
-          <a:lstStyle/>
-          <a:p>
-            <a:r>
-              <a:rPr lang="en-US" dirty="0" smtClean="0"/>
-              <a:t>Produce a program (possibly Python) that solve this problem:</a:t>
-            </a:r>
-          </a:p>
-          <a:p>
-            <a:pPr lvl="1"/>
-            <a:r>
-              <a:rPr lang="en-US" dirty="0" smtClean="0"/>
-              <a:t>Able to identify &amp; study people faces in the pictures, and</a:t>
-            </a:r>
-          </a:p>
-          <a:p>
-            <a:pPr lvl="1"/>
-            <a:r>
-              <a:rPr lang="en-US" dirty="0" smtClean="0"/>
-              <a:t>Tag each face with a label (ID, name, number, etc.) </a:t>
-            </a:r>
-          </a:p>
-          <a:p>
-            <a:pPr lvl="1"/>
-            <a:r>
-              <a:rPr lang="en-US" dirty="0" smtClean="0"/>
-              <a:t>When given a set of “new” pictures, able to recognize the “similar” face it has learnt from, by guessing the correct label (ID, name, number).</a:t>
-            </a:r>
-          </a:p>
-          <a:p>
-            <a:pPr lvl="1"/>
-            <a:endParaRPr lang="en-US" dirty="0"/>
-          </a:p>
-          <a:p>
-            <a:pPr lvl="1"/>
-            <a:endParaRPr lang="en-US" dirty="0" smtClean="0"/>
-          </a:p>
-          <a:p>
-            <a:pPr lvl="1"/>
-            <a:endParaRPr lang="en-US" dirty="0"/>
-          </a:p>
-          <a:p>
-            <a:pPr marL="457200" lvl="1" indent="0">
-              <a:buNone/>
-            </a:pPr>
-            <a:endParaRPr lang="en-US" dirty="0" smtClean="0"/>
-          </a:p>
-          <a:p>
-            <a:pPr lvl="1"/>
-            <a:endParaRPr lang="en-US" dirty="0"/>
-          </a:p>
-        </p:txBody>
-      </p:sp>
+      <p:pic>
+        <p:nvPicPr>
+          <p:cNvPr id="6" name="Picture 5"/>
+          <p:cNvPicPr>
+            <a:picLocks noChangeAspect="1"/>
+          </p:cNvPicPr>
+          <p:nvPr/>
+        </p:nvPicPr>
+        <p:blipFill>
+          <a:blip r:embed="rId2"/>
+          <a:stretch>
+            <a:fillRect/>
+          </a:stretch>
+        </p:blipFill>
+        <p:spPr>
+          <a:xfrm>
+            <a:off x="0" y="653067"/>
+            <a:ext cx="12192000" cy="5551866"/>
+          </a:xfrm>
+          <a:prstGeom prst="rect">
+            <a:avLst/>
+          </a:prstGeom>
+        </p:spPr>
+      </p:pic>
     </p:spTree>
     <p:extLst>
       <p:ext uri="{BB962C8B-B14F-4D97-AF65-F5344CB8AC3E}">
-        <p14:creationId xmlns:p14="http://schemas.microsoft.com/office/powerpoint/2010/main" val="1998898814"/>
+        <p14:creationId xmlns:p14="http://schemas.microsoft.com/office/powerpoint/2010/main" val="1131176229"/>
       </p:ext>
     </p:extLst>
   </p:cSld>
@@ -3187,7 +3136,7 @@
           <a:p>
             <a:r>
               <a:rPr lang="en-US" dirty="0" smtClean="0"/>
-              <a:t>The methodology</a:t>
+              <a:t>Obj-1: Locate The Face</a:t>
             </a:r>
             <a:endParaRPr lang="en-US" dirty="0"/>
           </a:p>
@@ -3210,60 +3159,17 @@
           <a:p>
             <a:r>
               <a:rPr lang="en-US" dirty="0" smtClean="0"/>
-              <a:t>From bird-eye view, the process of facial recognition is as follow:</a:t>
-            </a:r>
-          </a:p>
-          <a:p>
-            <a:pPr lvl="1"/>
-            <a:r>
-              <a:rPr lang="en-US" b="1" dirty="0" smtClean="0"/>
-              <a:t>Face detection </a:t>
-            </a:r>
-            <a:r>
-              <a:rPr lang="en-US" dirty="0" smtClean="0"/>
-              <a:t>and face representation:</a:t>
-            </a:r>
-          </a:p>
-          <a:p>
-            <a:pPr lvl="2"/>
-            <a:r>
-              <a:rPr lang="en-US" dirty="0" smtClean="0"/>
-              <a:t>Find the face in the photo – using </a:t>
+              <a:t>Locate the faces in photos – using </a:t>
             </a:r>
             <a:r>
               <a:rPr lang="en-US" dirty="0" err="1" smtClean="0"/>
               <a:t>OpenCV</a:t>
             </a:r>
+            <a:endParaRPr lang="en-US" dirty="0" smtClean="0"/>
+          </a:p>
+          <a:p>
+            <a:pPr lvl="1"/>
             <a:endParaRPr lang="en-US" dirty="0"/>
-          </a:p>
-          <a:p>
-            <a:pPr lvl="2"/>
-            <a:r>
-              <a:rPr lang="en-US" dirty="0" smtClean="0"/>
-              <a:t>Create a representation of each face (aka face signature)</a:t>
-            </a:r>
-          </a:p>
-          <a:p>
-            <a:pPr lvl="1"/>
-            <a:r>
-              <a:rPr lang="en-US" b="1" dirty="0" smtClean="0"/>
-              <a:t>Model training</a:t>
-            </a:r>
-            <a:r>
-              <a:rPr lang="en-US" dirty="0" smtClean="0"/>
-              <a:t>: convert several examples of a person’s face into a single model</a:t>
-            </a:r>
-          </a:p>
-          <a:p>
-            <a:pPr lvl="1"/>
-            <a:r>
-              <a:rPr lang="en-US" b="1" dirty="0" smtClean="0"/>
-              <a:t>Recognition</a:t>
-            </a:r>
-            <a:r>
-              <a:rPr lang="en-US" dirty="0" smtClean="0"/>
-              <a:t>: look into the new photo and guess if the faces are in the existing “known” database</a:t>
-            </a:r>
           </a:p>
           <a:p>
             <a:pPr lvl="1"/>
@@ -3273,12 +3179,970 @@
             <a:pPr lvl="1"/>
             <a:endParaRPr lang="en-US" dirty="0"/>
           </a:p>
-        </p:txBody>
-      </p:sp>
+          <a:p>
+            <a:pPr marL="457200" lvl="1" indent="0">
+              <a:buNone/>
+            </a:pPr>
+            <a:endParaRPr lang="en-US" dirty="0" smtClean="0"/>
+          </a:p>
+          <a:p>
+            <a:pPr lvl="1"/>
+            <a:endParaRPr lang="en-US" dirty="0"/>
+          </a:p>
+        </p:txBody>
+      </p:sp>
+      <p:pic>
+        <p:nvPicPr>
+          <p:cNvPr id="4" name="Picture 3"/>
+          <p:cNvPicPr>
+            <a:picLocks noChangeAspect="1"/>
+          </p:cNvPicPr>
+          <p:nvPr/>
+        </p:nvPicPr>
+        <p:blipFill>
+          <a:blip r:embed="rId2"/>
+          <a:stretch>
+            <a:fillRect/>
+          </a:stretch>
+        </p:blipFill>
+        <p:spPr>
+          <a:xfrm>
+            <a:off x="711199" y="2351567"/>
+            <a:ext cx="1556871" cy="1805970"/>
+          </a:xfrm>
+          <a:prstGeom prst="rect">
+            <a:avLst/>
+          </a:prstGeom>
+        </p:spPr>
+      </p:pic>
+      <p:pic>
+        <p:nvPicPr>
+          <p:cNvPr id="6" name="Picture 5"/>
+          <p:cNvPicPr>
+            <a:picLocks noChangeAspect="1"/>
+          </p:cNvPicPr>
+          <p:nvPr/>
+        </p:nvPicPr>
+        <p:blipFill>
+          <a:blip r:embed="rId3"/>
+          <a:stretch>
+            <a:fillRect/>
+          </a:stretch>
+        </p:blipFill>
+        <p:spPr>
+          <a:xfrm>
+            <a:off x="2487840" y="2419380"/>
+            <a:ext cx="2353101" cy="1994450"/>
+          </a:xfrm>
+          <a:prstGeom prst="rect">
+            <a:avLst/>
+          </a:prstGeom>
+        </p:spPr>
+      </p:pic>
+      <p:pic>
+        <p:nvPicPr>
+          <p:cNvPr id="7" name="Picture 6"/>
+          <p:cNvPicPr/>
+          <p:nvPr/>
+        </p:nvPicPr>
+        <p:blipFill>
+          <a:blip r:embed="rId4"/>
+          <a:stretch>
+            <a:fillRect/>
+          </a:stretch>
+        </p:blipFill>
+        <p:spPr>
+          <a:xfrm>
+            <a:off x="6776141" y="2532491"/>
+            <a:ext cx="2520259" cy="1977065"/>
+          </a:xfrm>
+          <a:prstGeom prst="rect">
+            <a:avLst/>
+          </a:prstGeom>
+        </p:spPr>
+      </p:pic>
+      <p:pic>
+        <p:nvPicPr>
+          <p:cNvPr id="8" name="Picture 7"/>
+          <p:cNvPicPr/>
+          <p:nvPr/>
+        </p:nvPicPr>
+        <p:blipFill>
+          <a:blip r:embed="rId5"/>
+          <a:stretch>
+            <a:fillRect/>
+          </a:stretch>
+        </p:blipFill>
+        <p:spPr>
+          <a:xfrm>
+            <a:off x="8729895" y="2953066"/>
+            <a:ext cx="3071401" cy="2408942"/>
+          </a:xfrm>
+          <a:prstGeom prst="rect">
+            <a:avLst/>
+          </a:prstGeom>
+        </p:spPr>
+      </p:pic>
+      <p:pic>
+        <p:nvPicPr>
+          <p:cNvPr id="9" name="Picture 8"/>
+          <p:cNvPicPr/>
+          <p:nvPr/>
+        </p:nvPicPr>
+        <p:blipFill>
+          <a:blip r:embed="rId6"/>
+          <a:stretch>
+            <a:fillRect/>
+          </a:stretch>
+        </p:blipFill>
+        <p:spPr>
+          <a:xfrm>
+            <a:off x="6927915" y="4814318"/>
+            <a:ext cx="2216710" cy="1738744"/>
+          </a:xfrm>
+          <a:prstGeom prst="rect">
+            <a:avLst/>
+          </a:prstGeom>
+        </p:spPr>
+      </p:pic>
+      <p:pic>
+        <p:nvPicPr>
+          <p:cNvPr id="11" name="Picture 10"/>
+          <p:cNvPicPr>
+            <a:picLocks noChangeAspect="1"/>
+          </p:cNvPicPr>
+          <p:nvPr/>
+        </p:nvPicPr>
+        <p:blipFill>
+          <a:blip r:embed="rId7"/>
+          <a:stretch>
+            <a:fillRect/>
+          </a:stretch>
+        </p:blipFill>
+        <p:spPr>
+          <a:xfrm>
+            <a:off x="1285696" y="4157537"/>
+            <a:ext cx="1340716" cy="1738741"/>
+          </a:xfrm>
+          <a:prstGeom prst="rect">
+            <a:avLst/>
+          </a:prstGeom>
+        </p:spPr>
+      </p:pic>
     </p:spTree>
     <p:extLst>
       <p:ext uri="{BB962C8B-B14F-4D97-AF65-F5344CB8AC3E}">
-        <p14:creationId xmlns:p14="http://schemas.microsoft.com/office/powerpoint/2010/main" val="235745791"/>
+        <p14:creationId xmlns:p14="http://schemas.microsoft.com/office/powerpoint/2010/main" val="1998898814"/>
+      </p:ext>
+    </p:extLst>
+  </p:cSld>
+  <p:clrMapOvr>
+    <a:masterClrMapping/>
+  </p:clrMapOvr>
+</p:sld>
+</file>
+
+<file path=ppt/slides/slide4.xml><?xml version="1.0" encoding="utf-8"?>
+<p:sld xmlns:a="http://schemas.openxmlformats.org/drawingml/2006/main" xmlns:r="http://schemas.openxmlformats.org/officeDocument/2006/relationships" xmlns:p="http://schemas.openxmlformats.org/presentationml/2006/main">
+  <p:cSld>
+    <p:spTree>
+      <p:nvGrpSpPr>
+        <p:cNvPr id="1" name=""/>
+        <p:cNvGrpSpPr/>
+        <p:nvPr/>
+      </p:nvGrpSpPr>
+      <p:grpSpPr>
+        <a:xfrm>
+          <a:off x="0" y="0"/>
+          <a:ext cx="0" cy="0"/>
+          <a:chOff x="0" y="0"/>
+          <a:chExt cx="0" cy="0"/>
+        </a:xfrm>
+      </p:grpSpPr>
+      <p:sp>
+        <p:nvSpPr>
+          <p:cNvPr id="14" name="Rectangle 13"/>
+          <p:cNvSpPr/>
+          <p:nvPr/>
+        </p:nvSpPr>
+        <p:spPr>
+          <a:xfrm>
+            <a:off x="3774141" y="2348753"/>
+            <a:ext cx="8301318" cy="4410635"/>
+          </a:xfrm>
+          <a:prstGeom prst="rect">
+            <a:avLst/>
+          </a:prstGeom>
+          <a:solidFill>
+            <a:schemeClr val="accent6">
+              <a:lumMod val="60000"/>
+              <a:lumOff val="40000"/>
+              <a:alpha val="13000"/>
+            </a:schemeClr>
+          </a:solidFill>
+          <a:ln>
+            <a:noFill/>
+          </a:ln>
+        </p:spPr>
+        <p:style>
+          <a:lnRef idx="2">
+            <a:schemeClr val="accent1">
+              <a:shade val="50000"/>
+            </a:schemeClr>
+          </a:lnRef>
+          <a:fillRef idx="1">
+            <a:schemeClr val="accent1"/>
+          </a:fillRef>
+          <a:effectRef idx="0">
+            <a:schemeClr val="accent1"/>
+          </a:effectRef>
+          <a:fontRef idx="minor">
+            <a:schemeClr val="lt1"/>
+          </a:fontRef>
+        </p:style>
+        <p:txBody>
+          <a:bodyPr rtlCol="0" anchor="ctr"/>
+          <a:lstStyle/>
+          <a:p>
+            <a:pPr algn="ctr"/>
+            <a:endParaRPr lang="en-US"/>
+          </a:p>
+        </p:txBody>
+      </p:sp>
+      <p:sp>
+        <p:nvSpPr>
+          <p:cNvPr id="2" name="Title 1"/>
+          <p:cNvSpPr>
+            <a:spLocks noGrp="1"/>
+          </p:cNvSpPr>
+          <p:nvPr>
+            <p:ph type="title"/>
+          </p:nvPr>
+        </p:nvSpPr>
+        <p:spPr/>
+        <p:txBody>
+          <a:bodyPr/>
+          <a:lstStyle/>
+          <a:p>
+            <a:r>
+              <a:rPr lang="en-US" dirty="0" smtClean="0"/>
+              <a:t>Obj2 – Recognize the face</a:t>
+            </a:r>
+            <a:endParaRPr lang="en-US" dirty="0"/>
+          </a:p>
+        </p:txBody>
+      </p:sp>
+      <p:sp>
+        <p:nvSpPr>
+          <p:cNvPr id="3" name="Content Placeholder 2"/>
+          <p:cNvSpPr>
+            <a:spLocks noGrp="1"/>
+          </p:cNvSpPr>
+          <p:nvPr>
+            <p:ph idx="1"/>
+          </p:nvPr>
+        </p:nvSpPr>
+        <p:spPr>
+          <a:xfrm>
+            <a:off x="838200" y="1825625"/>
+            <a:ext cx="10869706" cy="4351338"/>
+          </a:xfrm>
+        </p:spPr>
+        <p:txBody>
+          <a:bodyPr/>
+          <a:lstStyle/>
+          <a:p>
+            <a:r>
+              <a:rPr lang="en-US" dirty="0" smtClean="0"/>
+              <a:t>The program should go through these 5 steps before it can recognize a face properly</a:t>
+            </a:r>
+          </a:p>
+          <a:p>
+            <a:pPr lvl="1"/>
+            <a:r>
+              <a:rPr lang="en-US" dirty="0"/>
+              <a:t>Training Data</a:t>
+            </a:r>
+          </a:p>
+          <a:p>
+            <a:pPr lvl="1"/>
+            <a:r>
+              <a:rPr lang="en-US" dirty="0" smtClean="0"/>
+              <a:t>Test Data</a:t>
+            </a:r>
+          </a:p>
+          <a:p>
+            <a:pPr lvl="1"/>
+            <a:r>
+              <a:rPr lang="en-US" dirty="0" smtClean="0"/>
+              <a:t>PCA</a:t>
+            </a:r>
+          </a:p>
+          <a:p>
+            <a:pPr lvl="1"/>
+            <a:r>
+              <a:rPr lang="en-US" dirty="0" smtClean="0"/>
+              <a:t>Training</a:t>
+            </a:r>
+          </a:p>
+          <a:p>
+            <a:pPr lvl="1"/>
+            <a:r>
+              <a:rPr lang="en-US" dirty="0" smtClean="0"/>
+              <a:t>Validation</a:t>
+            </a:r>
+            <a:endParaRPr lang="en-US" dirty="0" smtClean="0"/>
+          </a:p>
+          <a:p>
+            <a:pPr lvl="1"/>
+            <a:endParaRPr lang="en-US" dirty="0"/>
+          </a:p>
+          <a:p>
+            <a:pPr lvl="1"/>
+            <a:endParaRPr lang="en-US" dirty="0" smtClean="0"/>
+          </a:p>
+          <a:p>
+            <a:pPr lvl="1"/>
+            <a:endParaRPr lang="en-US" dirty="0"/>
+          </a:p>
+          <a:p>
+            <a:pPr marL="457200" lvl="1" indent="0">
+              <a:buNone/>
+            </a:pPr>
+            <a:endParaRPr lang="en-US" dirty="0" smtClean="0"/>
+          </a:p>
+          <a:p>
+            <a:pPr lvl="1"/>
+            <a:endParaRPr lang="en-US" dirty="0"/>
+          </a:p>
+        </p:txBody>
+      </p:sp>
+      <p:pic>
+        <p:nvPicPr>
+          <p:cNvPr id="12" name="Picture 11"/>
+          <p:cNvPicPr>
+            <a:picLocks noChangeAspect="1"/>
+          </p:cNvPicPr>
+          <p:nvPr/>
+        </p:nvPicPr>
+        <p:blipFill>
+          <a:blip r:embed="rId2"/>
+          <a:stretch>
+            <a:fillRect/>
+          </a:stretch>
+        </p:blipFill>
+        <p:spPr>
+          <a:xfrm>
+            <a:off x="3979210" y="2846294"/>
+            <a:ext cx="2205318" cy="1312255"/>
+          </a:xfrm>
+          <a:prstGeom prst="rect">
+            <a:avLst/>
+          </a:prstGeom>
+        </p:spPr>
+      </p:pic>
+      <p:sp>
+        <p:nvSpPr>
+          <p:cNvPr id="13" name="TextBox 12"/>
+          <p:cNvSpPr txBox="1"/>
+          <p:nvPr/>
+        </p:nvSpPr>
+        <p:spPr>
+          <a:xfrm>
+            <a:off x="3916456" y="2476962"/>
+            <a:ext cx="2205318" cy="369332"/>
+          </a:xfrm>
+          <a:prstGeom prst="rect">
+            <a:avLst/>
+          </a:prstGeom>
+          <a:noFill/>
+        </p:spPr>
+        <p:txBody>
+          <a:bodyPr wrap="square" rtlCol="0">
+            <a:spAutoFit/>
+          </a:bodyPr>
+          <a:lstStyle/>
+          <a:p>
+            <a:r>
+              <a:rPr lang="en-US" smtClean="0"/>
+              <a:t>Training Data</a:t>
+            </a:r>
+            <a:endParaRPr lang="en-US"/>
+          </a:p>
+        </p:txBody>
+      </p:sp>
+      <p:sp>
+        <p:nvSpPr>
+          <p:cNvPr id="15" name="TextBox 14"/>
+          <p:cNvSpPr txBox="1"/>
+          <p:nvPr/>
+        </p:nvSpPr>
+        <p:spPr>
+          <a:xfrm>
+            <a:off x="7057465" y="2440473"/>
+            <a:ext cx="2000250" cy="369332"/>
+          </a:xfrm>
+          <a:prstGeom prst="rect">
+            <a:avLst/>
+          </a:prstGeom>
+          <a:noFill/>
+        </p:spPr>
+        <p:txBody>
+          <a:bodyPr wrap="square" rtlCol="0">
+            <a:spAutoFit/>
+          </a:bodyPr>
+          <a:lstStyle/>
+          <a:p>
+            <a:r>
+              <a:rPr lang="en-US" dirty="0" err="1" smtClean="0"/>
+              <a:t>Eigenfaces</a:t>
+            </a:r>
+            <a:endParaRPr lang="en-US" dirty="0"/>
+          </a:p>
+        </p:txBody>
+      </p:sp>
+      <p:pic>
+        <p:nvPicPr>
+          <p:cNvPr id="16" name="Picture 15"/>
+          <p:cNvPicPr>
+            <a:picLocks noChangeAspect="1"/>
+          </p:cNvPicPr>
+          <p:nvPr/>
+        </p:nvPicPr>
+        <p:blipFill>
+          <a:blip r:embed="rId3"/>
+          <a:stretch>
+            <a:fillRect/>
+          </a:stretch>
+        </p:blipFill>
+        <p:spPr>
+          <a:xfrm>
+            <a:off x="7120219" y="2809805"/>
+            <a:ext cx="1437159" cy="1257025"/>
+          </a:xfrm>
+          <a:prstGeom prst="rect">
+            <a:avLst/>
+          </a:prstGeom>
+        </p:spPr>
+      </p:pic>
+      <p:sp>
+        <p:nvSpPr>
+          <p:cNvPr id="17" name="Right Arrow 16"/>
+          <p:cNvSpPr/>
+          <p:nvPr/>
+        </p:nvSpPr>
+        <p:spPr>
+          <a:xfrm>
+            <a:off x="6273053" y="3281082"/>
+            <a:ext cx="784412" cy="221339"/>
+          </a:xfrm>
+          <a:prstGeom prst="rightArrow">
+            <a:avLst/>
+          </a:prstGeom>
+        </p:spPr>
+        <p:style>
+          <a:lnRef idx="2">
+            <a:schemeClr val="accent6">
+              <a:shade val="50000"/>
+            </a:schemeClr>
+          </a:lnRef>
+          <a:fillRef idx="1">
+            <a:schemeClr val="accent6"/>
+          </a:fillRef>
+          <a:effectRef idx="0">
+            <a:schemeClr val="accent6"/>
+          </a:effectRef>
+          <a:fontRef idx="minor">
+            <a:schemeClr val="lt1"/>
+          </a:fontRef>
+        </p:style>
+        <p:txBody>
+          <a:bodyPr rtlCol="0" anchor="ctr"/>
+          <a:lstStyle/>
+          <a:p>
+            <a:pPr algn="ctr"/>
+            <a:endParaRPr lang="en-US"/>
+          </a:p>
+        </p:txBody>
+      </p:sp>
+      <p:sp>
+        <p:nvSpPr>
+          <p:cNvPr id="18" name="Right Arrow 17"/>
+          <p:cNvSpPr/>
+          <p:nvPr/>
+        </p:nvSpPr>
+        <p:spPr>
+          <a:xfrm rot="8639055">
+            <a:off x="6141435" y="4607691"/>
+            <a:ext cx="1383713" cy="228331"/>
+          </a:xfrm>
+          <a:prstGeom prst="rightArrow">
+            <a:avLst/>
+          </a:prstGeom>
+        </p:spPr>
+        <p:style>
+          <a:lnRef idx="2">
+            <a:schemeClr val="accent6">
+              <a:shade val="50000"/>
+            </a:schemeClr>
+          </a:lnRef>
+          <a:fillRef idx="1">
+            <a:schemeClr val="accent6"/>
+          </a:fillRef>
+          <a:effectRef idx="0">
+            <a:schemeClr val="accent6"/>
+          </a:effectRef>
+          <a:fontRef idx="minor">
+            <a:schemeClr val="lt1"/>
+          </a:fontRef>
+        </p:style>
+        <p:txBody>
+          <a:bodyPr rtlCol="0" anchor="ctr"/>
+          <a:lstStyle/>
+          <a:p>
+            <a:pPr algn="ctr"/>
+            <a:endParaRPr lang="en-US"/>
+          </a:p>
+        </p:txBody>
+      </p:sp>
+      <p:sp>
+        <p:nvSpPr>
+          <p:cNvPr id="21" name="Right Arrow 20"/>
+          <p:cNvSpPr/>
+          <p:nvPr/>
+        </p:nvSpPr>
+        <p:spPr>
+          <a:xfrm rot="5400000">
+            <a:off x="7395879" y="4589927"/>
+            <a:ext cx="815794" cy="242047"/>
+          </a:xfrm>
+          <a:prstGeom prst="rightArrow">
+            <a:avLst/>
+          </a:prstGeom>
+        </p:spPr>
+        <p:style>
+          <a:lnRef idx="2">
+            <a:schemeClr val="accent6">
+              <a:shade val="50000"/>
+            </a:schemeClr>
+          </a:lnRef>
+          <a:fillRef idx="1">
+            <a:schemeClr val="accent6"/>
+          </a:fillRef>
+          <a:effectRef idx="0">
+            <a:schemeClr val="accent6"/>
+          </a:effectRef>
+          <a:fontRef idx="minor">
+            <a:schemeClr val="lt1"/>
+          </a:fontRef>
+        </p:style>
+        <p:txBody>
+          <a:bodyPr rtlCol="0" anchor="ctr"/>
+          <a:lstStyle/>
+          <a:p>
+            <a:pPr algn="ctr"/>
+            <a:endParaRPr lang="en-US"/>
+          </a:p>
+        </p:txBody>
+      </p:sp>
+      <p:sp>
+        <p:nvSpPr>
+          <p:cNvPr id="22" name="Right Arrow 21"/>
+          <p:cNvSpPr/>
+          <p:nvPr/>
+        </p:nvSpPr>
+        <p:spPr>
+          <a:xfrm rot="2221764">
+            <a:off x="8090433" y="4557177"/>
+            <a:ext cx="1257901" cy="231657"/>
+          </a:xfrm>
+          <a:prstGeom prst="rightArrow">
+            <a:avLst/>
+          </a:prstGeom>
+        </p:spPr>
+        <p:style>
+          <a:lnRef idx="2">
+            <a:schemeClr val="accent6">
+              <a:shade val="50000"/>
+            </a:schemeClr>
+          </a:lnRef>
+          <a:fillRef idx="1">
+            <a:schemeClr val="accent6"/>
+          </a:fillRef>
+          <a:effectRef idx="0">
+            <a:schemeClr val="accent6"/>
+          </a:effectRef>
+          <a:fontRef idx="minor">
+            <a:schemeClr val="lt1"/>
+          </a:fontRef>
+        </p:style>
+        <p:txBody>
+          <a:bodyPr rtlCol="0" anchor="ctr"/>
+          <a:lstStyle/>
+          <a:p>
+            <a:pPr algn="ctr"/>
+            <a:endParaRPr lang="en-US"/>
+          </a:p>
+        </p:txBody>
+      </p:sp>
+      <p:pic>
+        <p:nvPicPr>
+          <p:cNvPr id="25" name="Picture 24"/>
+          <p:cNvPicPr>
+            <a:picLocks noChangeAspect="1"/>
+          </p:cNvPicPr>
+          <p:nvPr/>
+        </p:nvPicPr>
+        <p:blipFill>
+          <a:blip r:embed="rId4"/>
+          <a:stretch>
+            <a:fillRect/>
+          </a:stretch>
+        </p:blipFill>
+        <p:spPr>
+          <a:xfrm>
+            <a:off x="5519063" y="5176524"/>
+            <a:ext cx="1063812" cy="1492661"/>
+          </a:xfrm>
+          <a:prstGeom prst="rect">
+            <a:avLst/>
+          </a:prstGeom>
+        </p:spPr>
+      </p:pic>
+      <p:pic>
+        <p:nvPicPr>
+          <p:cNvPr id="26" name="Picture 25"/>
+          <p:cNvPicPr>
+            <a:picLocks noChangeAspect="1"/>
+          </p:cNvPicPr>
+          <p:nvPr/>
+        </p:nvPicPr>
+        <p:blipFill>
+          <a:blip r:embed="rId5"/>
+          <a:stretch>
+            <a:fillRect/>
+          </a:stretch>
+        </p:blipFill>
+        <p:spPr>
+          <a:xfrm>
+            <a:off x="7195331" y="5176524"/>
+            <a:ext cx="1286933" cy="1447800"/>
+          </a:xfrm>
+          <a:prstGeom prst="rect">
+            <a:avLst/>
+          </a:prstGeom>
+        </p:spPr>
+      </p:pic>
+      <p:pic>
+        <p:nvPicPr>
+          <p:cNvPr id="27" name="Picture 26"/>
+          <p:cNvPicPr>
+            <a:picLocks noChangeAspect="1"/>
+          </p:cNvPicPr>
+          <p:nvPr/>
+        </p:nvPicPr>
+        <p:blipFill>
+          <a:blip r:embed="rId6"/>
+          <a:stretch>
+            <a:fillRect/>
+          </a:stretch>
+        </p:blipFill>
+        <p:spPr>
+          <a:xfrm>
+            <a:off x="8923790" y="5266259"/>
+            <a:ext cx="1027034" cy="1344773"/>
+          </a:xfrm>
+          <a:prstGeom prst="rect">
+            <a:avLst/>
+          </a:prstGeom>
+        </p:spPr>
+      </p:pic>
+      <p:sp>
+        <p:nvSpPr>
+          <p:cNvPr id="28" name="TextBox 27"/>
+          <p:cNvSpPr txBox="1"/>
+          <p:nvPr/>
+        </p:nvSpPr>
+        <p:spPr>
+          <a:xfrm>
+            <a:off x="5838996" y="4749516"/>
+            <a:ext cx="842682" cy="369332"/>
+          </a:xfrm>
+          <a:prstGeom prst="rect">
+            <a:avLst/>
+          </a:prstGeom>
+          <a:solidFill>
+            <a:schemeClr val="bg1">
+              <a:alpha val="37000"/>
+            </a:schemeClr>
+          </a:solidFill>
+        </p:spPr>
+        <p:txBody>
+          <a:bodyPr wrap="square" rtlCol="0">
+            <a:spAutoFit/>
+          </a:bodyPr>
+          <a:lstStyle/>
+          <a:p>
+            <a:r>
+              <a:rPr lang="en-US" dirty="0" smtClean="0">
+                <a:solidFill>
+                  <a:srgbClr val="FF0000"/>
+                </a:solidFill>
+              </a:rPr>
+              <a:t>Trish</a:t>
+            </a:r>
+            <a:endParaRPr lang="en-US" dirty="0">
+              <a:solidFill>
+                <a:srgbClr val="FF0000"/>
+              </a:solidFill>
+            </a:endParaRPr>
+          </a:p>
+        </p:txBody>
+      </p:sp>
+      <p:sp>
+        <p:nvSpPr>
+          <p:cNvPr id="29" name="TextBox 28"/>
+          <p:cNvSpPr txBox="1"/>
+          <p:nvPr/>
+        </p:nvSpPr>
+        <p:spPr>
+          <a:xfrm>
+            <a:off x="8741288" y="4662818"/>
+            <a:ext cx="842682" cy="369332"/>
+          </a:xfrm>
+          <a:prstGeom prst="rect">
+            <a:avLst/>
+          </a:prstGeom>
+          <a:solidFill>
+            <a:schemeClr val="bg1">
+              <a:alpha val="37000"/>
+            </a:schemeClr>
+          </a:solidFill>
+        </p:spPr>
+        <p:txBody>
+          <a:bodyPr wrap="square" rtlCol="0">
+            <a:spAutoFit/>
+          </a:bodyPr>
+          <a:lstStyle/>
+          <a:p>
+            <a:r>
+              <a:rPr lang="en-US" dirty="0" smtClean="0">
+                <a:solidFill>
+                  <a:srgbClr val="FF0000"/>
+                </a:solidFill>
+              </a:rPr>
+              <a:t>Steven</a:t>
+            </a:r>
+            <a:endParaRPr lang="en-US" dirty="0">
+              <a:solidFill>
+                <a:srgbClr val="FF0000"/>
+              </a:solidFill>
+            </a:endParaRPr>
+          </a:p>
+        </p:txBody>
+      </p:sp>
+      <p:sp>
+        <p:nvSpPr>
+          <p:cNvPr id="30" name="TextBox 29"/>
+          <p:cNvSpPr txBox="1"/>
+          <p:nvPr/>
+        </p:nvSpPr>
+        <p:spPr>
+          <a:xfrm>
+            <a:off x="7382436" y="4710950"/>
+            <a:ext cx="842682" cy="369332"/>
+          </a:xfrm>
+          <a:prstGeom prst="rect">
+            <a:avLst/>
+          </a:prstGeom>
+          <a:solidFill>
+            <a:schemeClr val="bg1">
+              <a:alpha val="37000"/>
+            </a:schemeClr>
+          </a:solidFill>
+        </p:spPr>
+        <p:txBody>
+          <a:bodyPr wrap="square" rtlCol="0">
+            <a:spAutoFit/>
+          </a:bodyPr>
+          <a:lstStyle/>
+          <a:p>
+            <a:r>
+              <a:rPr lang="en-US" dirty="0" smtClean="0">
+                <a:solidFill>
+                  <a:srgbClr val="FF0000"/>
+                </a:solidFill>
+              </a:rPr>
+              <a:t>Tracy</a:t>
+            </a:r>
+            <a:endParaRPr lang="en-US" dirty="0">
+              <a:solidFill>
+                <a:srgbClr val="FF0000"/>
+              </a:solidFill>
+            </a:endParaRPr>
+          </a:p>
+        </p:txBody>
+      </p:sp>
+    </p:spTree>
+    <p:extLst>
+      <p:ext uri="{BB962C8B-B14F-4D97-AF65-F5344CB8AC3E}">
+        <p14:creationId xmlns:p14="http://schemas.microsoft.com/office/powerpoint/2010/main" val="1172755590"/>
+      </p:ext>
+    </p:extLst>
+  </p:cSld>
+  <p:clrMapOvr>
+    <a:masterClrMapping/>
+  </p:clrMapOvr>
+</p:sld>
+</file>
+
+<file path=ppt/slides/slide5.xml><?xml version="1.0" encoding="utf-8"?>
+<p:sld xmlns:a="http://schemas.openxmlformats.org/drawingml/2006/main" xmlns:r="http://schemas.openxmlformats.org/officeDocument/2006/relationships" xmlns:p="http://schemas.openxmlformats.org/presentationml/2006/main">
+  <p:cSld>
+    <p:spTree>
+      <p:nvGrpSpPr>
+        <p:cNvPr id="1" name=""/>
+        <p:cNvGrpSpPr/>
+        <p:nvPr/>
+      </p:nvGrpSpPr>
+      <p:grpSpPr>
+        <a:xfrm>
+          <a:off x="0" y="0"/>
+          <a:ext cx="0" cy="0"/>
+          <a:chOff x="0" y="0"/>
+          <a:chExt cx="0" cy="0"/>
+        </a:xfrm>
+      </p:grpSpPr>
+      <p:sp>
+        <p:nvSpPr>
+          <p:cNvPr id="2" name="Title 1"/>
+          <p:cNvSpPr>
+            <a:spLocks noGrp="1"/>
+          </p:cNvSpPr>
+          <p:nvPr>
+            <p:ph type="title"/>
+          </p:nvPr>
+        </p:nvSpPr>
+        <p:spPr/>
+        <p:txBody>
+          <a:bodyPr/>
+          <a:lstStyle/>
+          <a:p>
+            <a:r>
+              <a:rPr lang="en-US" dirty="0" smtClean="0"/>
+              <a:t>Obj3 – Presenting and Storing Data</a:t>
+            </a:r>
+            <a:endParaRPr lang="en-US" dirty="0"/>
+          </a:p>
+        </p:txBody>
+      </p:sp>
+      <p:sp>
+        <p:nvSpPr>
+          <p:cNvPr id="3" name="Content Placeholder 2"/>
+          <p:cNvSpPr>
+            <a:spLocks noGrp="1"/>
+          </p:cNvSpPr>
+          <p:nvPr>
+            <p:ph idx="1"/>
+          </p:nvPr>
+        </p:nvSpPr>
+        <p:spPr>
+          <a:xfrm>
+            <a:off x="838200" y="1825625"/>
+            <a:ext cx="10869706" cy="4351338"/>
+          </a:xfrm>
+        </p:spPr>
+        <p:txBody>
+          <a:bodyPr/>
+          <a:lstStyle/>
+          <a:p>
+            <a:r>
+              <a:rPr lang="en-US" dirty="0" smtClean="0"/>
+              <a:t>The classification result will be stored into a database, which can be implemented by</a:t>
+            </a:r>
+          </a:p>
+          <a:p>
+            <a:pPr lvl="1"/>
+            <a:r>
+              <a:rPr lang="en-US" dirty="0" smtClean="0"/>
+              <a:t>File system (txt, </a:t>
+            </a:r>
+            <a:r>
+              <a:rPr lang="en-US" dirty="0" err="1" smtClean="0"/>
+              <a:t>dat</a:t>
+            </a:r>
+            <a:r>
+              <a:rPr lang="en-US" dirty="0" smtClean="0"/>
+              <a:t>, etc.)</a:t>
+            </a:r>
+          </a:p>
+          <a:p>
+            <a:pPr lvl="1"/>
+            <a:r>
+              <a:rPr lang="en-US" dirty="0" smtClean="0"/>
+              <a:t>Spreadsheet (</a:t>
+            </a:r>
+            <a:r>
+              <a:rPr lang="en-US" dirty="0" err="1" smtClean="0"/>
+              <a:t>xlsx</a:t>
+            </a:r>
+            <a:r>
+              <a:rPr lang="en-US" dirty="0" smtClean="0"/>
+              <a:t>, csv, etc.)</a:t>
+            </a:r>
+          </a:p>
+          <a:p>
+            <a:pPr lvl="1"/>
+            <a:r>
+              <a:rPr lang="en-US" dirty="0" smtClean="0"/>
+              <a:t>“Real-world” database system (mongo, </a:t>
+            </a:r>
+            <a:r>
+              <a:rPr lang="en-US" dirty="0" err="1" smtClean="0"/>
+              <a:t>redis</a:t>
+            </a:r>
+            <a:r>
+              <a:rPr lang="en-US" dirty="0" smtClean="0"/>
+              <a:t>, </a:t>
+            </a:r>
+            <a:r>
+              <a:rPr lang="en-US" dirty="0" err="1" smtClean="0"/>
+              <a:t>mysql</a:t>
+            </a:r>
+            <a:r>
+              <a:rPr lang="en-US" dirty="0" smtClean="0"/>
+              <a:t>, etc.) </a:t>
+            </a:r>
+            <a:endParaRPr lang="en-US" dirty="0" smtClean="0"/>
+          </a:p>
+          <a:p>
+            <a:pPr lvl="1"/>
+            <a:endParaRPr lang="en-US" dirty="0"/>
+          </a:p>
+          <a:p>
+            <a:pPr lvl="1"/>
+            <a:endParaRPr lang="en-US" dirty="0" smtClean="0"/>
+          </a:p>
+          <a:p>
+            <a:pPr lvl="1"/>
+            <a:endParaRPr lang="en-US" dirty="0"/>
+          </a:p>
+          <a:p>
+            <a:pPr marL="457200" lvl="1" indent="0">
+              <a:buNone/>
+            </a:pPr>
+            <a:endParaRPr lang="en-US" dirty="0" smtClean="0"/>
+          </a:p>
+          <a:p>
+            <a:pPr lvl="1"/>
+            <a:endParaRPr lang="en-US" dirty="0"/>
+          </a:p>
+        </p:txBody>
+      </p:sp>
+    </p:spTree>
+    <p:extLst>
+      <p:ext uri="{BB962C8B-B14F-4D97-AF65-F5344CB8AC3E}">
+        <p14:creationId xmlns:p14="http://schemas.microsoft.com/office/powerpoint/2010/main" val="1894519218"/>
       </p:ext>
     </p:extLst>
   </p:cSld>

</xml_diff>